<commit_message>
Updated Phase 2 Presentation Slides
</commit_message>
<xml_diff>
--- a/deliverables/phase2/Phase2_Presentation.pptx
+++ b/deliverables/phase2/Phase2_Presentation.pptx
@@ -8,7 +8,8 @@
     <p:sldId id="256" r:id="rId2"/>
     <p:sldId id="257" r:id="rId3"/>
     <p:sldId id="258" r:id="rId4"/>
-    <p:sldId id="259" r:id="rId5"/>
+    <p:sldId id="260" r:id="rId5"/>
+    <p:sldId id="259" r:id="rId6"/>
   </p:sldIdLst>
   <p:sldSz cx="9144000" cy="6858000" type="screen4x3"/>
   <p:notesSz cx="6858000" cy="9144000"/>
@@ -213,7 +214,7 @@
                 <a:lstStyle/>
                 <a:p>
                   <a:pPr algn="ctr"/>
-                  <a:endParaRPr lang="en-US"/>
+                  <a:endParaRPr lang="en-US" dirty="0"/>
                 </a:p>
               </p:txBody>
             </p:sp>
@@ -261,7 +262,7 @@
                 <a:lstStyle/>
                 <a:p>
                   <a:pPr algn="ctr"/>
-                  <a:endParaRPr lang="en-US"/>
+                  <a:endParaRPr lang="en-US" dirty="0"/>
                 </a:p>
               </p:txBody>
             </p:sp>
@@ -309,7 +310,7 @@
                 <a:lstStyle/>
                 <a:p>
                   <a:pPr algn="ctr"/>
-                  <a:endParaRPr lang="en-US"/>
+                  <a:endParaRPr lang="en-US" dirty="0"/>
                 </a:p>
               </p:txBody>
             </p:sp>
@@ -372,7 +373,7 @@
                 <a:lstStyle/>
                 <a:p>
                   <a:pPr algn="ctr"/>
-                  <a:endParaRPr lang="en-US"/>
+                  <a:endParaRPr lang="en-US" dirty="0"/>
                 </a:p>
               </p:txBody>
             </p:sp>
@@ -420,7 +421,7 @@
                 <a:lstStyle/>
                 <a:p>
                   <a:pPr algn="ctr"/>
-                  <a:endParaRPr lang="en-US"/>
+                  <a:endParaRPr lang="en-US" dirty="0"/>
                 </a:p>
               </p:txBody>
             </p:sp>
@@ -468,7 +469,7 @@
                 <a:lstStyle/>
                 <a:p>
                   <a:pPr algn="ctr"/>
-                  <a:endParaRPr lang="en-US"/>
+                  <a:endParaRPr lang="en-US" dirty="0"/>
                 </a:p>
               </p:txBody>
             </p:sp>
@@ -531,7 +532,7 @@
                 <a:lstStyle/>
                 <a:p>
                   <a:pPr algn="ctr"/>
-                  <a:endParaRPr lang="en-US"/>
+                  <a:endParaRPr lang="en-US" dirty="0"/>
                 </a:p>
               </p:txBody>
             </p:sp>
@@ -579,7 +580,7 @@
                 <a:lstStyle/>
                 <a:p>
                   <a:pPr algn="ctr"/>
-                  <a:endParaRPr lang="en-US"/>
+                  <a:endParaRPr lang="en-US" dirty="0"/>
                 </a:p>
               </p:txBody>
             </p:sp>
@@ -627,7 +628,7 @@
                 <a:lstStyle/>
                 <a:p>
                   <a:pPr algn="ctr"/>
-                  <a:endParaRPr lang="en-US"/>
+                  <a:endParaRPr lang="en-US" dirty="0"/>
                 </a:p>
               </p:txBody>
             </p:sp>
@@ -676,7 +677,7 @@
               <a:lstStyle/>
               <a:p>
                 <a:pPr algn="ctr"/>
-                <a:endParaRPr lang="en-US"/>
+                <a:endParaRPr lang="en-US" dirty="0"/>
               </a:p>
             </p:txBody>
           </p:sp>
@@ -724,7 +725,7 @@
               <a:lstStyle/>
               <a:p>
                 <a:pPr algn="ctr"/>
-                <a:endParaRPr lang="en-US"/>
+                <a:endParaRPr lang="en-US" dirty="0"/>
               </a:p>
             </p:txBody>
           </p:sp>
@@ -772,7 +773,7 @@
               <a:lstStyle/>
               <a:p>
                 <a:pPr algn="ctr"/>
-                <a:endParaRPr lang="en-US"/>
+                <a:endParaRPr lang="en-US" dirty="0"/>
               </a:p>
             </p:txBody>
           </p:sp>
@@ -916,7 +917,7 @@
             <a:lstStyle/>
             <a:p>
               <a:pPr algn="ctr"/>
-              <a:endParaRPr lang="en-US"/>
+              <a:endParaRPr lang="en-US" dirty="0"/>
             </a:p>
           </p:txBody>
         </p:sp>
@@ -1019,7 +1020,7 @@
             <a:lstStyle/>
             <a:p>
               <a:pPr algn="ctr"/>
-              <a:endParaRPr lang="en-US"/>
+              <a:endParaRPr lang="en-US" dirty="0"/>
             </a:p>
           </p:txBody>
         </p:sp>
@@ -1092,7 +1093,7 @@
             <a:lstStyle/>
             <a:p>
               <a:pPr algn="ctr"/>
-              <a:endParaRPr lang="en-US"/>
+              <a:endParaRPr lang="en-US" dirty="0"/>
             </a:p>
           </p:txBody>
         </p:sp>
@@ -1215,7 +1216,7 @@
             <a:lstStyle/>
             <a:p>
               <a:pPr algn="ctr"/>
-              <a:endParaRPr lang="en-US"/>
+              <a:endParaRPr lang="en-US" dirty="0"/>
             </a:p>
           </p:txBody>
         </p:sp>
@@ -1376,7 +1377,7 @@
             <a:lstStyle/>
             <a:p>
               <a:pPr algn="ctr"/>
-              <a:endParaRPr lang="en-US"/>
+              <a:endParaRPr lang="en-US" dirty="0"/>
             </a:p>
           </p:txBody>
         </p:sp>
@@ -1431,7 +1432,7 @@
             <a:lstStyle/>
             <a:p>
               <a:pPr algn="ctr"/>
-              <a:endParaRPr lang="en-US"/>
+              <a:endParaRPr lang="en-US" dirty="0"/>
             </a:p>
           </p:txBody>
         </p:sp>
@@ -1486,7 +1487,7 @@
             <a:lstStyle/>
             <a:p>
               <a:pPr algn="ctr"/>
-              <a:endParaRPr lang="en-US"/>
+              <a:endParaRPr lang="en-US" dirty="0"/>
             </a:p>
           </p:txBody>
         </p:sp>
@@ -1541,7 +1542,7 @@
             <a:lstStyle/>
             <a:p>
               <a:pPr algn="ctr"/>
-              <a:endParaRPr lang="en-US"/>
+              <a:endParaRPr lang="en-US" dirty="0"/>
             </a:p>
           </p:txBody>
         </p:sp>
@@ -1596,7 +1597,7 @@
             <a:lstStyle/>
             <a:p>
               <a:pPr algn="ctr"/>
-              <a:endParaRPr lang="en-US"/>
+              <a:endParaRPr lang="en-US" dirty="0"/>
             </a:p>
           </p:txBody>
         </p:sp>
@@ -1651,7 +1652,7 @@
             <a:lstStyle/>
             <a:p>
               <a:pPr algn="ctr"/>
-              <a:endParaRPr lang="en-US"/>
+              <a:endParaRPr lang="en-US" dirty="0"/>
             </a:p>
           </p:txBody>
         </p:sp>
@@ -1798,7 +1799,7 @@
             <a:lstStyle/>
             <a:p>
               <a:pPr algn="ctr"/>
-              <a:endParaRPr lang="en-US"/>
+              <a:endParaRPr lang="en-US" dirty="0"/>
             </a:p>
           </p:txBody>
         </p:sp>
@@ -1853,7 +1854,7 @@
             <a:lstStyle/>
             <a:p>
               <a:pPr algn="ctr"/>
-              <a:endParaRPr lang="en-US"/>
+              <a:endParaRPr lang="en-US" dirty="0"/>
             </a:p>
           </p:txBody>
         </p:sp>
@@ -1908,7 +1909,7 @@
             <a:lstStyle/>
             <a:p>
               <a:pPr algn="ctr"/>
-              <a:endParaRPr lang="en-US"/>
+              <a:endParaRPr lang="en-US" dirty="0"/>
             </a:p>
           </p:txBody>
         </p:sp>
@@ -1963,7 +1964,7 @@
             <a:lstStyle/>
             <a:p>
               <a:pPr algn="ctr"/>
-              <a:endParaRPr lang="en-US"/>
+              <a:endParaRPr lang="en-US" dirty="0"/>
             </a:p>
           </p:txBody>
         </p:sp>
@@ -2018,7 +2019,7 @@
             <a:lstStyle/>
             <a:p>
               <a:pPr algn="ctr"/>
-              <a:endParaRPr lang="en-US"/>
+              <a:endParaRPr lang="en-US" dirty="0"/>
             </a:p>
           </p:txBody>
         </p:sp>
@@ -2073,7 +2074,7 @@
             <a:lstStyle/>
             <a:p>
               <a:pPr algn="ctr"/>
-              <a:endParaRPr lang="en-US"/>
+              <a:endParaRPr lang="en-US" dirty="0"/>
             </a:p>
           </p:txBody>
         </p:sp>
@@ -2128,7 +2129,7 @@
             <a:lstStyle/>
             <a:p>
               <a:pPr algn="ctr"/>
-              <a:endParaRPr lang="en-US"/>
+              <a:endParaRPr lang="en-US" dirty="0"/>
             </a:p>
           </p:txBody>
         </p:sp>
@@ -2183,7 +2184,7 @@
             <a:lstStyle/>
             <a:p>
               <a:pPr algn="ctr"/>
-              <a:endParaRPr lang="en-US"/>
+              <a:endParaRPr lang="en-US" dirty="0"/>
             </a:p>
           </p:txBody>
         </p:sp>
@@ -2238,7 +2239,7 @@
             <a:lstStyle/>
             <a:p>
               <a:pPr algn="ctr"/>
-              <a:endParaRPr lang="en-US"/>
+              <a:endParaRPr lang="en-US" dirty="0"/>
             </a:p>
           </p:txBody>
         </p:sp>
@@ -2293,7 +2294,7 @@
             <a:lstStyle/>
             <a:p>
               <a:pPr algn="ctr"/>
-              <a:endParaRPr lang="en-US"/>
+              <a:endParaRPr lang="en-US" dirty="0"/>
             </a:p>
           </p:txBody>
         </p:sp>
@@ -2440,7 +2441,7 @@
             <a:lstStyle/>
             <a:p>
               <a:pPr algn="ctr"/>
-              <a:endParaRPr lang="en-US"/>
+              <a:endParaRPr lang="en-US" dirty="0"/>
             </a:p>
           </p:txBody>
         </p:sp>
@@ -2587,7 +2588,7 @@
             <a:lstStyle/>
             <a:p>
               <a:pPr algn="ctr"/>
-              <a:endParaRPr lang="en-US"/>
+              <a:endParaRPr lang="en-US" dirty="0"/>
             </a:p>
           </p:txBody>
         </p:sp>
@@ -2638,7 +2639,7 @@
           <a:lstStyle/>
           <a:p>
             <a:pPr algn="ctr"/>
-            <a:endParaRPr lang="en-US"/>
+            <a:endParaRPr lang="en-US" dirty="0"/>
           </a:p>
         </p:txBody>
       </p:sp>
@@ -2684,7 +2685,7 @@
           <a:lstStyle/>
           <a:p>
             <a:pPr algn="ctr"/>
-            <a:endParaRPr lang="en-US"/>
+            <a:endParaRPr lang="en-US" dirty="0"/>
           </a:p>
         </p:txBody>
       </p:sp>
@@ -2916,7 +2917,7 @@
           <a:lstStyle/>
           <a:p>
             <a:pPr algn="ctr"/>
-            <a:endParaRPr lang="en-US"/>
+            <a:endParaRPr lang="en-US" dirty="0"/>
           </a:p>
         </p:txBody>
       </p:sp>
@@ -3033,7 +3034,7 @@
           <a:lstStyle/>
           <a:p>
             <a:pPr algn="ctr"/>
-            <a:endParaRPr lang="en-US"/>
+            <a:endParaRPr lang="en-US" dirty="0"/>
           </a:p>
         </p:txBody>
       </p:sp>
@@ -3157,7 +3158,7 @@
               <a:pPr/>
               <a:t>February 26, 2012</a:t>
             </a:fld>
-            <a:endParaRPr lang="en-US"/>
+            <a:endParaRPr lang="en-US" dirty="0"/>
           </a:p>
         </p:txBody>
       </p:sp>
@@ -3176,7 +3177,7 @@
           <a:bodyPr/>
           <a:lstStyle/>
           <a:p>
-            <a:endParaRPr lang="en-US"/>
+            <a:endParaRPr lang="en-US" dirty="0"/>
           </a:p>
         </p:txBody>
       </p:sp>
@@ -3200,7 +3201,7 @@
               <a:pPr/>
               <a:t>‹#›</a:t>
             </a:fld>
-            <a:endParaRPr lang="en-US"/>
+            <a:endParaRPr lang="en-US" dirty="0"/>
           </a:p>
         </p:txBody>
       </p:sp>
@@ -3334,7 +3335,7 @@
               <a:pPr/>
               <a:t>February 26, 2012</a:t>
             </a:fld>
-            <a:endParaRPr lang="en-US"/>
+            <a:endParaRPr lang="en-US" dirty="0"/>
           </a:p>
         </p:txBody>
       </p:sp>
@@ -3353,7 +3354,7 @@
           <a:bodyPr/>
           <a:lstStyle/>
           <a:p>
-            <a:endParaRPr lang="en-US"/>
+            <a:endParaRPr lang="en-US" dirty="0"/>
           </a:p>
         </p:txBody>
       </p:sp>
@@ -3377,7 +3378,7 @@
               <a:pPr/>
               <a:t>‹#›</a:t>
             </a:fld>
-            <a:endParaRPr lang="en-US"/>
+            <a:endParaRPr lang="en-US" dirty="0"/>
           </a:p>
         </p:txBody>
       </p:sp>
@@ -3501,7 +3502,7 @@
               <a:pPr/>
               <a:t>February 26, 2012</a:t>
             </a:fld>
-            <a:endParaRPr lang="en-US"/>
+            <a:endParaRPr lang="en-US" dirty="0"/>
           </a:p>
         </p:txBody>
       </p:sp>
@@ -3520,7 +3521,7 @@
           <a:bodyPr/>
           <a:lstStyle/>
           <a:p>
-            <a:endParaRPr lang="en-US"/>
+            <a:endParaRPr lang="en-US" dirty="0"/>
           </a:p>
         </p:txBody>
       </p:sp>
@@ -3544,7 +3545,7 @@
               <a:pPr/>
               <a:t>‹#›</a:t>
             </a:fld>
-            <a:endParaRPr lang="en-US"/>
+            <a:endParaRPr lang="en-US" dirty="0"/>
           </a:p>
         </p:txBody>
       </p:sp>
@@ -3744,7 +3745,7 @@
               <a:pPr/>
               <a:t>February 26, 2012</a:t>
             </a:fld>
-            <a:endParaRPr lang="en-US"/>
+            <a:endParaRPr lang="en-US" dirty="0"/>
           </a:p>
         </p:txBody>
       </p:sp>
@@ -3763,7 +3764,7 @@
           <a:bodyPr/>
           <a:lstStyle/>
           <a:p>
-            <a:endParaRPr lang="en-US"/>
+            <a:endParaRPr lang="en-US" dirty="0"/>
           </a:p>
         </p:txBody>
       </p:sp>
@@ -3787,7 +3788,7 @@
               <a:pPr/>
               <a:t>‹#›</a:t>
             </a:fld>
-            <a:endParaRPr lang="en-US"/>
+            <a:endParaRPr lang="en-US" dirty="0"/>
           </a:p>
         </p:txBody>
       </p:sp>
@@ -3859,7 +3860,7 @@
               <a:pPr/>
               <a:t>February 26, 2012</a:t>
             </a:fld>
-            <a:endParaRPr lang="en-US"/>
+            <a:endParaRPr lang="en-US" dirty="0"/>
           </a:p>
         </p:txBody>
       </p:sp>
@@ -3878,7 +3879,7 @@
           <a:bodyPr/>
           <a:lstStyle/>
           <a:p>
-            <a:endParaRPr lang="en-US"/>
+            <a:endParaRPr lang="en-US" dirty="0"/>
           </a:p>
         </p:txBody>
       </p:sp>
@@ -3902,7 +3903,7 @@
               <a:pPr/>
               <a:t>‹#›</a:t>
             </a:fld>
-            <a:endParaRPr lang="en-US"/>
+            <a:endParaRPr lang="en-US" dirty="0"/>
           </a:p>
         </p:txBody>
       </p:sp>
@@ -4400,7 +4401,7 @@
               <a:pPr/>
               <a:t>February 26, 2012</a:t>
             </a:fld>
-            <a:endParaRPr lang="en-US"/>
+            <a:endParaRPr lang="en-US" dirty="0"/>
           </a:p>
         </p:txBody>
       </p:sp>
@@ -4419,7 +4420,7 @@
           <a:bodyPr/>
           <a:lstStyle/>
           <a:p>
-            <a:endParaRPr lang="en-US"/>
+            <a:endParaRPr lang="en-US" dirty="0"/>
           </a:p>
         </p:txBody>
       </p:sp>
@@ -4443,7 +4444,7 @@
               <a:pPr/>
               <a:t>‹#›</a:t>
             </a:fld>
-            <a:endParaRPr lang="en-US"/>
+            <a:endParaRPr lang="en-US" dirty="0"/>
           </a:p>
         </p:txBody>
       </p:sp>
@@ -4515,7 +4516,7 @@
               <a:pPr/>
               <a:t>February 26, 2012</a:t>
             </a:fld>
-            <a:endParaRPr lang="en-US"/>
+            <a:endParaRPr lang="en-US" dirty="0"/>
           </a:p>
         </p:txBody>
       </p:sp>
@@ -4558,7 +4559,7 @@
               <a:pPr/>
               <a:t>‹#›</a:t>
             </a:fld>
-            <a:endParaRPr lang="en-US"/>
+            <a:endParaRPr lang="en-US" dirty="0"/>
           </a:p>
         </p:txBody>
       </p:sp>
@@ -4607,7 +4608,7 @@
               <a:pPr/>
               <a:t>February 26, 2012</a:t>
             </a:fld>
-            <a:endParaRPr lang="en-US"/>
+            <a:endParaRPr lang="en-US" dirty="0"/>
           </a:p>
         </p:txBody>
       </p:sp>
@@ -4626,7 +4627,7 @@
           <a:bodyPr/>
           <a:lstStyle/>
           <a:p>
-            <a:endParaRPr lang="en-US"/>
+            <a:endParaRPr lang="en-US" dirty="0"/>
           </a:p>
         </p:txBody>
       </p:sp>
@@ -4650,7 +4651,7 @@
               <a:pPr/>
               <a:t>‹#›</a:t>
             </a:fld>
-            <a:endParaRPr lang="en-US"/>
+            <a:endParaRPr lang="en-US" dirty="0"/>
           </a:p>
         </p:txBody>
       </p:sp>
@@ -4765,7 +4766,7 @@
                 <a:lstStyle/>
                 <a:p>
                   <a:pPr algn="ctr"/>
-                  <a:endParaRPr lang="en-US"/>
+                  <a:endParaRPr lang="en-US" dirty="0"/>
                 </a:p>
               </p:txBody>
             </p:sp>
@@ -4813,7 +4814,7 @@
                 <a:lstStyle/>
                 <a:p>
                   <a:pPr algn="ctr"/>
-                  <a:endParaRPr lang="en-US"/>
+                  <a:endParaRPr lang="en-US" dirty="0"/>
                 </a:p>
               </p:txBody>
             </p:sp>
@@ -4861,7 +4862,7 @@
                 <a:lstStyle/>
                 <a:p>
                   <a:pPr algn="ctr"/>
-                  <a:endParaRPr lang="en-US"/>
+                  <a:endParaRPr lang="en-US" dirty="0"/>
                 </a:p>
               </p:txBody>
             </p:sp>
@@ -4924,7 +4925,7 @@
                 <a:lstStyle/>
                 <a:p>
                   <a:pPr algn="ctr"/>
-                  <a:endParaRPr lang="en-US"/>
+                  <a:endParaRPr lang="en-US" dirty="0"/>
                 </a:p>
               </p:txBody>
             </p:sp>
@@ -4972,7 +4973,7 @@
                 <a:lstStyle/>
                 <a:p>
                   <a:pPr algn="ctr"/>
-                  <a:endParaRPr lang="en-US"/>
+                  <a:endParaRPr lang="en-US" dirty="0"/>
                 </a:p>
               </p:txBody>
             </p:sp>
@@ -5020,7 +5021,7 @@
                 <a:lstStyle/>
                 <a:p>
                   <a:pPr algn="ctr"/>
-                  <a:endParaRPr lang="en-US"/>
+                  <a:endParaRPr lang="en-US" dirty="0"/>
                 </a:p>
               </p:txBody>
             </p:sp>
@@ -5083,7 +5084,7 @@
                 <a:lstStyle/>
                 <a:p>
                   <a:pPr algn="ctr"/>
-                  <a:endParaRPr lang="en-US"/>
+                  <a:endParaRPr lang="en-US" dirty="0"/>
                 </a:p>
               </p:txBody>
             </p:sp>
@@ -5131,7 +5132,7 @@
                 <a:lstStyle/>
                 <a:p>
                   <a:pPr algn="ctr"/>
-                  <a:endParaRPr lang="en-US"/>
+                  <a:endParaRPr lang="en-US" dirty="0"/>
                 </a:p>
               </p:txBody>
             </p:sp>
@@ -5179,7 +5180,7 @@
                 <a:lstStyle/>
                 <a:p>
                   <a:pPr algn="ctr"/>
-                  <a:endParaRPr lang="en-US"/>
+                  <a:endParaRPr lang="en-US" dirty="0"/>
                 </a:p>
               </p:txBody>
             </p:sp>
@@ -5228,7 +5229,7 @@
               <a:lstStyle/>
               <a:p>
                 <a:pPr algn="ctr"/>
-                <a:endParaRPr lang="en-US"/>
+                <a:endParaRPr lang="en-US" dirty="0"/>
               </a:p>
             </p:txBody>
           </p:sp>
@@ -5276,7 +5277,7 @@
               <a:lstStyle/>
               <a:p>
                 <a:pPr algn="ctr"/>
-                <a:endParaRPr lang="en-US"/>
+                <a:endParaRPr lang="en-US" dirty="0"/>
               </a:p>
             </p:txBody>
           </p:sp>
@@ -5324,7 +5325,7 @@
               <a:lstStyle/>
               <a:p>
                 <a:pPr algn="ctr"/>
-                <a:endParaRPr lang="en-US"/>
+                <a:endParaRPr lang="en-US" dirty="0"/>
               </a:p>
             </p:txBody>
           </p:sp>
@@ -5468,7 +5469,7 @@
             <a:lstStyle/>
             <a:p>
               <a:pPr algn="ctr"/>
-              <a:endParaRPr lang="en-US"/>
+              <a:endParaRPr lang="en-US" dirty="0"/>
             </a:p>
           </p:txBody>
         </p:sp>
@@ -5571,7 +5572,7 @@
             <a:lstStyle/>
             <a:p>
               <a:pPr algn="ctr"/>
-              <a:endParaRPr lang="en-US"/>
+              <a:endParaRPr lang="en-US" dirty="0"/>
             </a:p>
           </p:txBody>
         </p:sp>
@@ -5644,7 +5645,7 @@
             <a:lstStyle/>
             <a:p>
               <a:pPr algn="ctr"/>
-              <a:endParaRPr lang="en-US"/>
+              <a:endParaRPr lang="en-US" dirty="0"/>
             </a:p>
           </p:txBody>
         </p:sp>
@@ -5767,7 +5768,7 @@
             <a:lstStyle/>
             <a:p>
               <a:pPr algn="ctr"/>
-              <a:endParaRPr lang="en-US"/>
+              <a:endParaRPr lang="en-US" dirty="0"/>
             </a:p>
           </p:txBody>
         </p:sp>
@@ -5928,7 +5929,7 @@
             <a:lstStyle/>
             <a:p>
               <a:pPr algn="ctr"/>
-              <a:endParaRPr lang="en-US"/>
+              <a:endParaRPr lang="en-US" dirty="0"/>
             </a:p>
           </p:txBody>
         </p:sp>
@@ -5983,7 +5984,7 @@
             <a:lstStyle/>
             <a:p>
               <a:pPr algn="ctr"/>
-              <a:endParaRPr lang="en-US"/>
+              <a:endParaRPr lang="en-US" dirty="0"/>
             </a:p>
           </p:txBody>
         </p:sp>
@@ -6038,7 +6039,7 @@
             <a:lstStyle/>
             <a:p>
               <a:pPr algn="ctr"/>
-              <a:endParaRPr lang="en-US"/>
+              <a:endParaRPr lang="en-US" dirty="0"/>
             </a:p>
           </p:txBody>
         </p:sp>
@@ -6093,7 +6094,7 @@
             <a:lstStyle/>
             <a:p>
               <a:pPr algn="ctr"/>
-              <a:endParaRPr lang="en-US"/>
+              <a:endParaRPr lang="en-US" dirty="0"/>
             </a:p>
           </p:txBody>
         </p:sp>
@@ -6148,7 +6149,7 @@
             <a:lstStyle/>
             <a:p>
               <a:pPr algn="ctr"/>
-              <a:endParaRPr lang="en-US"/>
+              <a:endParaRPr lang="en-US" dirty="0"/>
             </a:p>
           </p:txBody>
         </p:sp>
@@ -6203,7 +6204,7 @@
             <a:lstStyle/>
             <a:p>
               <a:pPr algn="ctr"/>
-              <a:endParaRPr lang="en-US"/>
+              <a:endParaRPr lang="en-US" dirty="0"/>
             </a:p>
           </p:txBody>
         </p:sp>
@@ -6350,7 +6351,7 @@
             <a:lstStyle/>
             <a:p>
               <a:pPr algn="ctr"/>
-              <a:endParaRPr lang="en-US"/>
+              <a:endParaRPr lang="en-US" dirty="0"/>
             </a:p>
           </p:txBody>
         </p:sp>
@@ -6405,7 +6406,7 @@
             <a:lstStyle/>
             <a:p>
               <a:pPr algn="ctr"/>
-              <a:endParaRPr lang="en-US"/>
+              <a:endParaRPr lang="en-US" dirty="0"/>
             </a:p>
           </p:txBody>
         </p:sp>
@@ -6460,7 +6461,7 @@
             <a:lstStyle/>
             <a:p>
               <a:pPr algn="ctr"/>
-              <a:endParaRPr lang="en-US"/>
+              <a:endParaRPr lang="en-US" dirty="0"/>
             </a:p>
           </p:txBody>
         </p:sp>
@@ -6515,7 +6516,7 @@
             <a:lstStyle/>
             <a:p>
               <a:pPr algn="ctr"/>
-              <a:endParaRPr lang="en-US"/>
+              <a:endParaRPr lang="en-US" dirty="0"/>
             </a:p>
           </p:txBody>
         </p:sp>
@@ -6570,7 +6571,7 @@
             <a:lstStyle/>
             <a:p>
               <a:pPr algn="ctr"/>
-              <a:endParaRPr lang="en-US"/>
+              <a:endParaRPr lang="en-US" dirty="0"/>
             </a:p>
           </p:txBody>
         </p:sp>
@@ -6625,7 +6626,7 @@
             <a:lstStyle/>
             <a:p>
               <a:pPr algn="ctr"/>
-              <a:endParaRPr lang="en-US"/>
+              <a:endParaRPr lang="en-US" dirty="0"/>
             </a:p>
           </p:txBody>
         </p:sp>
@@ -6680,7 +6681,7 @@
             <a:lstStyle/>
             <a:p>
               <a:pPr algn="ctr"/>
-              <a:endParaRPr lang="en-US"/>
+              <a:endParaRPr lang="en-US" dirty="0"/>
             </a:p>
           </p:txBody>
         </p:sp>
@@ -6735,7 +6736,7 @@
             <a:lstStyle/>
             <a:p>
               <a:pPr algn="ctr"/>
-              <a:endParaRPr lang="en-US"/>
+              <a:endParaRPr lang="en-US" dirty="0"/>
             </a:p>
           </p:txBody>
         </p:sp>
@@ -6790,7 +6791,7 @@
             <a:lstStyle/>
             <a:p>
               <a:pPr algn="ctr"/>
-              <a:endParaRPr lang="en-US"/>
+              <a:endParaRPr lang="en-US" dirty="0"/>
             </a:p>
           </p:txBody>
         </p:sp>
@@ -6845,7 +6846,7 @@
             <a:lstStyle/>
             <a:p>
               <a:pPr algn="ctr"/>
-              <a:endParaRPr lang="en-US"/>
+              <a:endParaRPr lang="en-US" dirty="0"/>
             </a:p>
           </p:txBody>
         </p:sp>
@@ -6992,7 +6993,7 @@
             <a:lstStyle/>
             <a:p>
               <a:pPr algn="ctr"/>
-              <a:endParaRPr lang="en-US"/>
+              <a:endParaRPr lang="en-US" dirty="0"/>
             </a:p>
           </p:txBody>
         </p:sp>
@@ -7139,7 +7140,7 @@
             <a:lstStyle/>
             <a:p>
               <a:pPr algn="ctr"/>
-              <a:endParaRPr lang="en-US"/>
+              <a:endParaRPr lang="en-US" dirty="0"/>
             </a:p>
           </p:txBody>
         </p:sp>
@@ -7190,7 +7191,7 @@
           <a:lstStyle/>
           <a:p>
             <a:pPr algn="ctr"/>
-            <a:endParaRPr lang="en-US"/>
+            <a:endParaRPr lang="en-US" dirty="0"/>
           </a:p>
         </p:txBody>
       </p:sp>
@@ -7236,7 +7237,7 @@
           <a:lstStyle/>
           <a:p>
             <a:pPr algn="ctr"/>
-            <a:endParaRPr lang="en-US"/>
+            <a:endParaRPr lang="en-US" dirty="0"/>
           </a:p>
         </p:txBody>
       </p:sp>
@@ -7260,7 +7261,7 @@
               <a:pPr/>
               <a:t>February 26, 2012</a:t>
             </a:fld>
-            <a:endParaRPr lang="en-US"/>
+            <a:endParaRPr lang="en-US" dirty="0"/>
           </a:p>
         </p:txBody>
       </p:sp>
@@ -7284,7 +7285,7 @@
               <a:pPr/>
               <a:t>‹#›</a:t>
             </a:fld>
-            <a:endParaRPr lang="en-US"/>
+            <a:endParaRPr lang="en-US" dirty="0"/>
           </a:p>
         </p:txBody>
       </p:sp>
@@ -7332,7 +7333,7 @@
           <a:lstStyle/>
           <a:p>
             <a:pPr algn="ctr"/>
-            <a:endParaRPr lang="en-US"/>
+            <a:endParaRPr lang="en-US" dirty="0"/>
           </a:p>
         </p:txBody>
       </p:sp>
@@ -7463,7 +7464,7 @@
           <a:lstStyle/>
           <a:p>
             <a:pPr algn="ctr"/>
-            <a:endParaRPr lang="en-US"/>
+            <a:endParaRPr lang="en-US" dirty="0"/>
           </a:p>
         </p:txBody>
       </p:sp>
@@ -7709,7 +7710,7 @@
                 <a:lstStyle/>
                 <a:p>
                   <a:pPr algn="ctr"/>
-                  <a:endParaRPr lang="en-US"/>
+                  <a:endParaRPr lang="en-US" dirty="0"/>
                 </a:p>
               </p:txBody>
             </p:sp>
@@ -7757,7 +7758,7 @@
                 <a:lstStyle/>
                 <a:p>
                   <a:pPr algn="ctr"/>
-                  <a:endParaRPr lang="en-US"/>
+                  <a:endParaRPr lang="en-US" dirty="0"/>
                 </a:p>
               </p:txBody>
             </p:sp>
@@ -7805,7 +7806,7 @@
                 <a:lstStyle/>
                 <a:p>
                   <a:pPr algn="ctr"/>
-                  <a:endParaRPr lang="en-US"/>
+                  <a:endParaRPr lang="en-US" dirty="0"/>
                 </a:p>
               </p:txBody>
             </p:sp>
@@ -7868,7 +7869,7 @@
                 <a:lstStyle/>
                 <a:p>
                   <a:pPr algn="ctr"/>
-                  <a:endParaRPr lang="en-US"/>
+                  <a:endParaRPr lang="en-US" dirty="0"/>
                 </a:p>
               </p:txBody>
             </p:sp>
@@ -7916,7 +7917,7 @@
                 <a:lstStyle/>
                 <a:p>
                   <a:pPr algn="ctr"/>
-                  <a:endParaRPr lang="en-US"/>
+                  <a:endParaRPr lang="en-US" dirty="0"/>
                 </a:p>
               </p:txBody>
             </p:sp>
@@ -7964,7 +7965,7 @@
                 <a:lstStyle/>
                 <a:p>
                   <a:pPr algn="ctr"/>
-                  <a:endParaRPr lang="en-US"/>
+                  <a:endParaRPr lang="en-US" dirty="0"/>
                 </a:p>
               </p:txBody>
             </p:sp>
@@ -8027,7 +8028,7 @@
                 <a:lstStyle/>
                 <a:p>
                   <a:pPr algn="ctr"/>
-                  <a:endParaRPr lang="en-US"/>
+                  <a:endParaRPr lang="en-US" dirty="0"/>
                 </a:p>
               </p:txBody>
             </p:sp>
@@ -8075,7 +8076,7 @@
                 <a:lstStyle/>
                 <a:p>
                   <a:pPr algn="ctr"/>
-                  <a:endParaRPr lang="en-US"/>
+                  <a:endParaRPr lang="en-US" dirty="0"/>
                 </a:p>
               </p:txBody>
             </p:sp>
@@ -8123,7 +8124,7 @@
                 <a:lstStyle/>
                 <a:p>
                   <a:pPr algn="ctr"/>
-                  <a:endParaRPr lang="en-US"/>
+                  <a:endParaRPr lang="en-US" dirty="0"/>
                 </a:p>
               </p:txBody>
             </p:sp>
@@ -8172,7 +8173,7 @@
               <a:lstStyle/>
               <a:p>
                 <a:pPr algn="ctr"/>
-                <a:endParaRPr lang="en-US"/>
+                <a:endParaRPr lang="en-US" dirty="0"/>
               </a:p>
             </p:txBody>
           </p:sp>
@@ -8220,7 +8221,7 @@
               <a:lstStyle/>
               <a:p>
                 <a:pPr algn="ctr"/>
-                <a:endParaRPr lang="en-US"/>
+                <a:endParaRPr lang="en-US" dirty="0"/>
               </a:p>
             </p:txBody>
           </p:sp>
@@ -8268,7 +8269,7 @@
               <a:lstStyle/>
               <a:p>
                 <a:pPr algn="ctr"/>
-                <a:endParaRPr lang="en-US"/>
+                <a:endParaRPr lang="en-US" dirty="0"/>
               </a:p>
             </p:txBody>
           </p:sp>
@@ -8412,7 +8413,7 @@
             <a:lstStyle/>
             <a:p>
               <a:pPr algn="ctr"/>
-              <a:endParaRPr lang="en-US"/>
+              <a:endParaRPr lang="en-US" dirty="0"/>
             </a:p>
           </p:txBody>
         </p:sp>
@@ -8515,7 +8516,7 @@
             <a:lstStyle/>
             <a:p>
               <a:pPr algn="ctr"/>
-              <a:endParaRPr lang="en-US"/>
+              <a:endParaRPr lang="en-US" dirty="0"/>
             </a:p>
           </p:txBody>
         </p:sp>
@@ -8588,7 +8589,7 @@
             <a:lstStyle/>
             <a:p>
               <a:pPr algn="ctr"/>
-              <a:endParaRPr lang="en-US"/>
+              <a:endParaRPr lang="en-US" dirty="0"/>
             </a:p>
           </p:txBody>
         </p:sp>
@@ -8711,7 +8712,7 @@
             <a:lstStyle/>
             <a:p>
               <a:pPr algn="ctr"/>
-              <a:endParaRPr lang="en-US"/>
+              <a:endParaRPr lang="en-US" dirty="0"/>
             </a:p>
           </p:txBody>
         </p:sp>
@@ -8872,7 +8873,7 @@
             <a:lstStyle/>
             <a:p>
               <a:pPr algn="ctr"/>
-              <a:endParaRPr lang="en-US"/>
+              <a:endParaRPr lang="en-US" dirty="0"/>
             </a:p>
           </p:txBody>
         </p:sp>
@@ -8927,7 +8928,7 @@
             <a:lstStyle/>
             <a:p>
               <a:pPr algn="ctr"/>
-              <a:endParaRPr lang="en-US"/>
+              <a:endParaRPr lang="en-US" dirty="0"/>
             </a:p>
           </p:txBody>
         </p:sp>
@@ -8982,7 +8983,7 @@
             <a:lstStyle/>
             <a:p>
               <a:pPr algn="ctr"/>
-              <a:endParaRPr lang="en-US"/>
+              <a:endParaRPr lang="en-US" dirty="0"/>
             </a:p>
           </p:txBody>
         </p:sp>
@@ -9037,7 +9038,7 @@
             <a:lstStyle/>
             <a:p>
               <a:pPr algn="ctr"/>
-              <a:endParaRPr lang="en-US"/>
+              <a:endParaRPr lang="en-US" dirty="0"/>
             </a:p>
           </p:txBody>
         </p:sp>
@@ -9092,7 +9093,7 @@
             <a:lstStyle/>
             <a:p>
               <a:pPr algn="ctr"/>
-              <a:endParaRPr lang="en-US"/>
+              <a:endParaRPr lang="en-US" dirty="0"/>
             </a:p>
           </p:txBody>
         </p:sp>
@@ -9147,7 +9148,7 @@
             <a:lstStyle/>
             <a:p>
               <a:pPr algn="ctr"/>
-              <a:endParaRPr lang="en-US"/>
+              <a:endParaRPr lang="en-US" dirty="0"/>
             </a:p>
           </p:txBody>
         </p:sp>
@@ -9294,7 +9295,7 @@
             <a:lstStyle/>
             <a:p>
               <a:pPr algn="ctr"/>
-              <a:endParaRPr lang="en-US"/>
+              <a:endParaRPr lang="en-US" dirty="0"/>
             </a:p>
           </p:txBody>
         </p:sp>
@@ -9349,7 +9350,7 @@
             <a:lstStyle/>
             <a:p>
               <a:pPr algn="ctr"/>
-              <a:endParaRPr lang="en-US"/>
+              <a:endParaRPr lang="en-US" dirty="0"/>
             </a:p>
           </p:txBody>
         </p:sp>
@@ -9404,7 +9405,7 @@
             <a:lstStyle/>
             <a:p>
               <a:pPr algn="ctr"/>
-              <a:endParaRPr lang="en-US"/>
+              <a:endParaRPr lang="en-US" dirty="0"/>
             </a:p>
           </p:txBody>
         </p:sp>
@@ -9459,7 +9460,7 @@
             <a:lstStyle/>
             <a:p>
               <a:pPr algn="ctr"/>
-              <a:endParaRPr lang="en-US"/>
+              <a:endParaRPr lang="en-US" dirty="0"/>
             </a:p>
           </p:txBody>
         </p:sp>
@@ -9514,7 +9515,7 @@
             <a:lstStyle/>
             <a:p>
               <a:pPr algn="ctr"/>
-              <a:endParaRPr lang="en-US"/>
+              <a:endParaRPr lang="en-US" dirty="0"/>
             </a:p>
           </p:txBody>
         </p:sp>
@@ -9569,7 +9570,7 @@
             <a:lstStyle/>
             <a:p>
               <a:pPr algn="ctr"/>
-              <a:endParaRPr lang="en-US"/>
+              <a:endParaRPr lang="en-US" dirty="0"/>
             </a:p>
           </p:txBody>
         </p:sp>
@@ -9624,7 +9625,7 @@
             <a:lstStyle/>
             <a:p>
               <a:pPr algn="ctr"/>
-              <a:endParaRPr lang="en-US"/>
+              <a:endParaRPr lang="en-US" dirty="0"/>
             </a:p>
           </p:txBody>
         </p:sp>
@@ -9679,7 +9680,7 @@
             <a:lstStyle/>
             <a:p>
               <a:pPr algn="ctr"/>
-              <a:endParaRPr lang="en-US"/>
+              <a:endParaRPr lang="en-US" dirty="0"/>
             </a:p>
           </p:txBody>
         </p:sp>
@@ -9734,7 +9735,7 @@
             <a:lstStyle/>
             <a:p>
               <a:pPr algn="ctr"/>
-              <a:endParaRPr lang="en-US"/>
+              <a:endParaRPr lang="en-US" dirty="0"/>
             </a:p>
           </p:txBody>
         </p:sp>
@@ -9789,7 +9790,7 @@
             <a:lstStyle/>
             <a:p>
               <a:pPr algn="ctr"/>
-              <a:endParaRPr lang="en-US"/>
+              <a:endParaRPr lang="en-US" dirty="0"/>
             </a:p>
           </p:txBody>
         </p:sp>
@@ -9936,7 +9937,7 @@
             <a:lstStyle/>
             <a:p>
               <a:pPr algn="ctr"/>
-              <a:endParaRPr lang="en-US"/>
+              <a:endParaRPr lang="en-US" dirty="0"/>
             </a:p>
           </p:txBody>
         </p:sp>
@@ -10083,7 +10084,7 @@
             <a:lstStyle/>
             <a:p>
               <a:pPr algn="ctr"/>
-              <a:endParaRPr lang="en-US"/>
+              <a:endParaRPr lang="en-US" dirty="0"/>
             </a:p>
           </p:txBody>
         </p:sp>
@@ -10134,7 +10135,7 @@
           <a:lstStyle/>
           <a:p>
             <a:pPr algn="ctr"/>
-            <a:endParaRPr lang="en-US"/>
+            <a:endParaRPr lang="en-US" dirty="0"/>
           </a:p>
         </p:txBody>
       </p:sp>
@@ -10180,7 +10181,7 @@
           <a:lstStyle/>
           <a:p>
             <a:pPr algn="ctr"/>
-            <a:endParaRPr lang="en-US"/>
+            <a:endParaRPr lang="en-US" dirty="0"/>
           </a:p>
         </p:txBody>
       </p:sp>
@@ -10230,7 +10231,7 @@
           <a:lstStyle/>
           <a:p>
             <a:pPr algn="ctr"/>
-            <a:endParaRPr lang="en-US"/>
+            <a:endParaRPr lang="en-US" dirty="0"/>
           </a:p>
         </p:txBody>
       </p:sp>
@@ -10276,7 +10277,7 @@
           <a:lstStyle/>
           <a:p>
             <a:pPr algn="ctr"/>
-            <a:endParaRPr lang="en-US"/>
+            <a:endParaRPr lang="en-US" dirty="0"/>
           </a:p>
         </p:txBody>
       </p:sp>
@@ -10376,7 +10377,7 @@
           </a:lstStyle>
           <a:p>
             <a:r>
-              <a:rPr lang="en-US" smtClean="0"/>
+              <a:rPr lang="en-US" dirty="0" smtClean="0"/>
               <a:t>Drag picture to placeholder or click icon to add</a:t>
             </a:r>
             <a:endParaRPr lang="en-US" dirty="0"/>
@@ -10474,7 +10475,7 @@
               <a:pPr/>
               <a:t>February 26, 2012</a:t>
             </a:fld>
-            <a:endParaRPr lang="en-US"/>
+            <a:endParaRPr lang="en-US" dirty="0"/>
           </a:p>
         </p:txBody>
       </p:sp>
@@ -10524,7 +10525,7 @@
               <a:pPr/>
               <a:t>‹#›</a:t>
             </a:fld>
-            <a:endParaRPr lang="en-US"/>
+            <a:endParaRPr lang="en-US" dirty="0"/>
           </a:p>
         </p:txBody>
       </p:sp>
@@ -10644,7 +10645,7 @@
                 <a:lstStyle/>
                 <a:p>
                   <a:pPr algn="ctr"/>
-                  <a:endParaRPr lang="en-US"/>
+                  <a:endParaRPr lang="en-US" dirty="0"/>
                 </a:p>
               </p:txBody>
             </p:sp>
@@ -10692,7 +10693,7 @@
                 <a:lstStyle/>
                 <a:p>
                   <a:pPr algn="ctr"/>
-                  <a:endParaRPr lang="en-US"/>
+                  <a:endParaRPr lang="en-US" dirty="0"/>
                 </a:p>
               </p:txBody>
             </p:sp>
@@ -10740,7 +10741,7 @@
                 <a:lstStyle/>
                 <a:p>
                   <a:pPr algn="ctr"/>
-                  <a:endParaRPr lang="en-US"/>
+                  <a:endParaRPr lang="en-US" dirty="0"/>
                 </a:p>
               </p:txBody>
             </p:sp>
@@ -10803,7 +10804,7 @@
                 <a:lstStyle/>
                 <a:p>
                   <a:pPr algn="ctr"/>
-                  <a:endParaRPr lang="en-US"/>
+                  <a:endParaRPr lang="en-US" dirty="0"/>
                 </a:p>
               </p:txBody>
             </p:sp>
@@ -10851,7 +10852,7 @@
                 <a:lstStyle/>
                 <a:p>
                   <a:pPr algn="ctr"/>
-                  <a:endParaRPr lang="en-US"/>
+                  <a:endParaRPr lang="en-US" dirty="0"/>
                 </a:p>
               </p:txBody>
             </p:sp>
@@ -10899,7 +10900,7 @@
                 <a:lstStyle/>
                 <a:p>
                   <a:pPr algn="ctr"/>
-                  <a:endParaRPr lang="en-US"/>
+                  <a:endParaRPr lang="en-US" dirty="0"/>
                 </a:p>
               </p:txBody>
             </p:sp>
@@ -10962,7 +10963,7 @@
                 <a:lstStyle/>
                 <a:p>
                   <a:pPr algn="ctr"/>
-                  <a:endParaRPr lang="en-US"/>
+                  <a:endParaRPr lang="en-US" dirty="0"/>
                 </a:p>
               </p:txBody>
             </p:sp>
@@ -11010,7 +11011,7 @@
                 <a:lstStyle/>
                 <a:p>
                   <a:pPr algn="ctr"/>
-                  <a:endParaRPr lang="en-US"/>
+                  <a:endParaRPr lang="en-US" dirty="0"/>
                 </a:p>
               </p:txBody>
             </p:sp>
@@ -11058,7 +11059,7 @@
                 <a:lstStyle/>
                 <a:p>
                   <a:pPr algn="ctr"/>
-                  <a:endParaRPr lang="en-US"/>
+                  <a:endParaRPr lang="en-US" dirty="0"/>
                 </a:p>
               </p:txBody>
             </p:sp>
@@ -11107,7 +11108,7 @@
               <a:lstStyle/>
               <a:p>
                 <a:pPr algn="ctr"/>
-                <a:endParaRPr lang="en-US"/>
+                <a:endParaRPr lang="en-US" dirty="0"/>
               </a:p>
             </p:txBody>
           </p:sp>
@@ -11155,7 +11156,7 @@
               <a:lstStyle/>
               <a:p>
                 <a:pPr algn="ctr"/>
-                <a:endParaRPr lang="en-US"/>
+                <a:endParaRPr lang="en-US" dirty="0"/>
               </a:p>
             </p:txBody>
           </p:sp>
@@ -11203,7 +11204,7 @@
               <a:lstStyle/>
               <a:p>
                 <a:pPr algn="ctr"/>
-                <a:endParaRPr lang="en-US"/>
+                <a:endParaRPr lang="en-US" dirty="0"/>
               </a:p>
             </p:txBody>
           </p:sp>
@@ -11347,7 +11348,7 @@
             <a:lstStyle/>
             <a:p>
               <a:pPr algn="ctr"/>
-              <a:endParaRPr lang="en-US"/>
+              <a:endParaRPr lang="en-US" dirty="0"/>
             </a:p>
           </p:txBody>
         </p:sp>
@@ -11450,7 +11451,7 @@
             <a:lstStyle/>
             <a:p>
               <a:pPr algn="ctr"/>
-              <a:endParaRPr lang="en-US"/>
+              <a:endParaRPr lang="en-US" dirty="0"/>
             </a:p>
           </p:txBody>
         </p:sp>
@@ -11523,7 +11524,7 @@
             <a:lstStyle/>
             <a:p>
               <a:pPr algn="ctr"/>
-              <a:endParaRPr lang="en-US"/>
+              <a:endParaRPr lang="en-US" dirty="0"/>
             </a:p>
           </p:txBody>
         </p:sp>
@@ -11646,7 +11647,7 @@
             <a:lstStyle/>
             <a:p>
               <a:pPr algn="ctr"/>
-              <a:endParaRPr lang="en-US"/>
+              <a:endParaRPr lang="en-US" dirty="0"/>
             </a:p>
           </p:txBody>
         </p:sp>
@@ -11807,7 +11808,7 @@
             <a:lstStyle/>
             <a:p>
               <a:pPr algn="ctr"/>
-              <a:endParaRPr lang="en-US"/>
+              <a:endParaRPr lang="en-US" dirty="0"/>
             </a:p>
           </p:txBody>
         </p:sp>
@@ -11862,7 +11863,7 @@
             <a:lstStyle/>
             <a:p>
               <a:pPr algn="ctr"/>
-              <a:endParaRPr lang="en-US"/>
+              <a:endParaRPr lang="en-US" dirty="0"/>
             </a:p>
           </p:txBody>
         </p:sp>
@@ -11917,7 +11918,7 @@
             <a:lstStyle/>
             <a:p>
               <a:pPr algn="ctr"/>
-              <a:endParaRPr lang="en-US"/>
+              <a:endParaRPr lang="en-US" dirty="0"/>
             </a:p>
           </p:txBody>
         </p:sp>
@@ -11972,7 +11973,7 @@
             <a:lstStyle/>
             <a:p>
               <a:pPr algn="ctr"/>
-              <a:endParaRPr lang="en-US"/>
+              <a:endParaRPr lang="en-US" dirty="0"/>
             </a:p>
           </p:txBody>
         </p:sp>
@@ -12027,7 +12028,7 @@
             <a:lstStyle/>
             <a:p>
               <a:pPr algn="ctr"/>
-              <a:endParaRPr lang="en-US"/>
+              <a:endParaRPr lang="en-US" dirty="0"/>
             </a:p>
           </p:txBody>
         </p:sp>
@@ -12082,7 +12083,7 @@
             <a:lstStyle/>
             <a:p>
               <a:pPr algn="ctr"/>
-              <a:endParaRPr lang="en-US"/>
+              <a:endParaRPr lang="en-US" dirty="0"/>
             </a:p>
           </p:txBody>
         </p:sp>
@@ -12229,7 +12230,7 @@
             <a:lstStyle/>
             <a:p>
               <a:pPr algn="ctr"/>
-              <a:endParaRPr lang="en-US"/>
+              <a:endParaRPr lang="en-US" dirty="0"/>
             </a:p>
           </p:txBody>
         </p:sp>
@@ -12284,7 +12285,7 @@
             <a:lstStyle/>
             <a:p>
               <a:pPr algn="ctr"/>
-              <a:endParaRPr lang="en-US"/>
+              <a:endParaRPr lang="en-US" dirty="0"/>
             </a:p>
           </p:txBody>
         </p:sp>
@@ -12339,7 +12340,7 @@
             <a:lstStyle/>
             <a:p>
               <a:pPr algn="ctr"/>
-              <a:endParaRPr lang="en-US"/>
+              <a:endParaRPr lang="en-US" dirty="0"/>
             </a:p>
           </p:txBody>
         </p:sp>
@@ -12394,7 +12395,7 @@
             <a:lstStyle/>
             <a:p>
               <a:pPr algn="ctr"/>
-              <a:endParaRPr lang="en-US"/>
+              <a:endParaRPr lang="en-US" dirty="0"/>
             </a:p>
           </p:txBody>
         </p:sp>
@@ -12449,7 +12450,7 @@
             <a:lstStyle/>
             <a:p>
               <a:pPr algn="ctr"/>
-              <a:endParaRPr lang="en-US"/>
+              <a:endParaRPr lang="en-US" dirty="0"/>
             </a:p>
           </p:txBody>
         </p:sp>
@@ -12504,7 +12505,7 @@
             <a:lstStyle/>
             <a:p>
               <a:pPr algn="ctr"/>
-              <a:endParaRPr lang="en-US"/>
+              <a:endParaRPr lang="en-US" dirty="0"/>
             </a:p>
           </p:txBody>
         </p:sp>
@@ -12559,7 +12560,7 @@
             <a:lstStyle/>
             <a:p>
               <a:pPr algn="ctr"/>
-              <a:endParaRPr lang="en-US"/>
+              <a:endParaRPr lang="en-US" dirty="0"/>
             </a:p>
           </p:txBody>
         </p:sp>
@@ -12614,7 +12615,7 @@
             <a:lstStyle/>
             <a:p>
               <a:pPr algn="ctr"/>
-              <a:endParaRPr lang="en-US"/>
+              <a:endParaRPr lang="en-US" dirty="0"/>
             </a:p>
           </p:txBody>
         </p:sp>
@@ -12669,7 +12670,7 @@
             <a:lstStyle/>
             <a:p>
               <a:pPr algn="ctr"/>
-              <a:endParaRPr lang="en-US"/>
+              <a:endParaRPr lang="en-US" dirty="0"/>
             </a:p>
           </p:txBody>
         </p:sp>
@@ -12724,7 +12725,7 @@
             <a:lstStyle/>
             <a:p>
               <a:pPr algn="ctr"/>
-              <a:endParaRPr lang="en-US"/>
+              <a:endParaRPr lang="en-US" dirty="0"/>
             </a:p>
           </p:txBody>
         </p:sp>
@@ -12871,7 +12872,7 @@
             <a:lstStyle/>
             <a:p>
               <a:pPr algn="ctr"/>
-              <a:endParaRPr lang="en-US"/>
+              <a:endParaRPr lang="en-US" dirty="0"/>
             </a:p>
           </p:txBody>
         </p:sp>
@@ -13018,7 +13019,7 @@
             <a:lstStyle/>
             <a:p>
               <a:pPr algn="ctr"/>
-              <a:endParaRPr lang="en-US"/>
+              <a:endParaRPr lang="en-US" dirty="0"/>
             </a:p>
           </p:txBody>
         </p:sp>
@@ -13067,7 +13068,7 @@
           <a:lstStyle/>
           <a:p>
             <a:pPr algn="ctr"/>
-            <a:endParaRPr lang="en-US"/>
+            <a:endParaRPr lang="en-US" dirty="0"/>
           </a:p>
         </p:txBody>
       </p:sp>
@@ -13117,7 +13118,7 @@
           <a:lstStyle/>
           <a:p>
             <a:pPr algn="ctr"/>
-            <a:endParaRPr lang="en-US"/>
+            <a:endParaRPr lang="en-US" dirty="0"/>
           </a:p>
         </p:txBody>
       </p:sp>
@@ -13163,7 +13164,7 @@
           <a:lstStyle/>
           <a:p>
             <a:pPr algn="ctr"/>
-            <a:endParaRPr lang="en-US"/>
+            <a:endParaRPr lang="en-US" dirty="0"/>
           </a:p>
         </p:txBody>
       </p:sp>
@@ -13298,7 +13299,7 @@
               <a:pPr/>
               <a:t>February 26, 2012</a:t>
             </a:fld>
-            <a:endParaRPr lang="en-US"/>
+            <a:endParaRPr lang="en-US" dirty="0"/>
           </a:p>
         </p:txBody>
       </p:sp>
@@ -13373,7 +13374,7 @@
               <a:pPr/>
               <a:t>‹#›</a:t>
             </a:fld>
-            <a:endParaRPr lang="en-US"/>
+            <a:endParaRPr lang="en-US" dirty="0"/>
           </a:p>
         </p:txBody>
       </p:sp>
@@ -13841,73 +13842,38 @@
           <a:lstStyle/>
           <a:p>
             <a:r>
-              <a:rPr lang="en-US" dirty="0" err="1" smtClean="0"/>
-              <a:t>Churk</a:t>
-            </a:r>
-            <a:r>
               <a:rPr lang="en-US" dirty="0" smtClean="0"/>
-              <a:t> Leung</a:t>
-            </a:r>
-          </a:p>
-          <a:p>
-            <a:r>
-              <a:rPr lang="en-US" dirty="0" err="1" smtClean="0"/>
-              <a:t>Vanya</a:t>
-            </a:r>
-            <a:r>
-              <a:rPr lang="en-US" dirty="0" smtClean="0"/>
-              <a:t> </a:t>
-            </a:r>
-            <a:r>
-              <a:rPr lang="en-US" dirty="0" err="1" smtClean="0"/>
-              <a:t>Dineva</a:t>
-            </a:r>
-            <a:endParaRPr lang="en-US" dirty="0" smtClean="0"/>
-          </a:p>
-          <a:p>
-            <a:r>
-              <a:rPr lang="en-US" dirty="0" err="1" smtClean="0"/>
-              <a:t>Quan</a:t>
-            </a:r>
-            <a:r>
-              <a:rPr lang="en-US" dirty="0" smtClean="0"/>
-              <a:t> Pham</a:t>
+              <a:t>Churk Leung</a:t>
             </a:r>
           </a:p>
           <a:p>
             <a:r>
               <a:rPr lang="en-US" dirty="0" smtClean="0"/>
-              <a:t>Jonathan </a:t>
+              <a:t>Vanya Dineva</a:t>
             </a:r>
-            <a:r>
-              <a:rPr lang="en-US" dirty="0" err="1" smtClean="0"/>
-              <a:t>Reimels</a:t>
-            </a:r>
-            <a:endParaRPr lang="en-US" dirty="0" smtClean="0"/>
-          </a:p>
-          <a:p>
-            <a:r>
-              <a:rPr lang="en-US" dirty="0" err="1" smtClean="0"/>
-              <a:t>Laurene</a:t>
-            </a:r>
-            <a:r>
-              <a:rPr lang="en-US" dirty="0" smtClean="0"/>
-              <a:t> </a:t>
-            </a:r>
-            <a:r>
-              <a:rPr lang="en-US" dirty="0" err="1" smtClean="0"/>
-              <a:t>Assayah</a:t>
-            </a:r>
-            <a:endParaRPr lang="en-US" dirty="0" smtClean="0"/>
           </a:p>
           <a:p>
             <a:r>
               <a:rPr lang="en-US" dirty="0" smtClean="0"/>
-              <a:t>Vladimir </a:t>
+              <a:t>Quan Pham</a:t>
             </a:r>
+          </a:p>
+          <a:p>
             <a:r>
-              <a:rPr lang="en-US" dirty="0" err="1" smtClean="0"/>
-              <a:t>Velev</a:t>
+              <a:rPr lang="en-US" dirty="0" smtClean="0"/>
+              <a:t>Jonathan Reimels</a:t>
+            </a:r>
+          </a:p>
+          <a:p>
+            <a:r>
+              <a:rPr lang="en-US" dirty="0" smtClean="0"/>
+              <a:t>Laurene Assayah</a:t>
+            </a:r>
+          </a:p>
+          <a:p>
+            <a:r>
+              <a:rPr lang="en-US" dirty="0" smtClean="0"/>
+              <a:t>Vladimir Velev</a:t>
             </a:r>
             <a:endParaRPr lang="en-US" dirty="0"/>
           </a:p>
@@ -13988,6 +13954,26 @@
           <a:bodyPr/>
           <a:lstStyle/>
           <a:p>
+            <a:r>
+              <a:rPr lang="en-US" dirty="0" err="1" smtClean="0"/>
+              <a:t>Functoinal</a:t>
+            </a:r>
+            <a:endParaRPr lang="en-US" dirty="0" smtClean="0"/>
+          </a:p>
+          <a:p>
+            <a:endParaRPr lang="en-US" dirty="0"/>
+          </a:p>
+          <a:p>
+            <a:endParaRPr lang="en-US" dirty="0" smtClean="0"/>
+          </a:p>
+          <a:p>
+            <a:endParaRPr lang="en-US" dirty="0" smtClean="0"/>
+          </a:p>
+          <a:p>
+            <a:r>
+              <a:rPr lang="en-US" dirty="0" smtClean="0"/>
+              <a:t>Non-Functional</a:t>
+            </a:r>
             <a:endParaRPr lang="en-US" dirty="0"/>
           </a:p>
         </p:txBody>
@@ -14039,38 +14025,50 @@
             <p:ph type="title"/>
           </p:nvPr>
         </p:nvSpPr>
-        <p:spPr/>
+        <p:spPr>
+          <a:xfrm>
+            <a:off x="1043490" y="456164"/>
+            <a:ext cx="7024744" cy="1143000"/>
+          </a:xfrm>
+        </p:spPr>
         <p:txBody>
           <a:bodyPr/>
           <a:lstStyle/>
           <a:p>
             <a:r>
-              <a:rPr lang="en-US" dirty="0" err="1" smtClean="0"/>
+              <a:rPr lang="en-US" dirty="0" smtClean="0"/>
               <a:t>UCase</a:t>
             </a:r>
             <a:endParaRPr lang="en-US" dirty="0"/>
           </a:p>
         </p:txBody>
       </p:sp>
-      <p:sp>
-        <p:nvSpPr>
-          <p:cNvPr id="3" name="Content Placeholder 2"/>
-          <p:cNvSpPr>
-            <a:spLocks noGrp="1"/>
-          </p:cNvSpPr>
+      <p:pic>
+        <p:nvPicPr>
+          <p:cNvPr id="4" name="Content Placeholder 3" descr="UseCase.gif"/>
+          <p:cNvPicPr>
+            <a:picLocks noGrp="1"/>
+          </p:cNvPicPr>
           <p:nvPr>
             <p:ph idx="1"/>
           </p:nvPr>
-        </p:nvSpPr>
-        <p:spPr/>
-        <p:txBody>
-          <a:bodyPr/>
-          <a:lstStyle/>
-          <a:p>
-            <a:endParaRPr lang="en-US" dirty="0" smtClean="0"/>
-          </a:p>
-        </p:txBody>
-      </p:sp>
+        </p:nvPicPr>
+        <p:blipFill>
+          <a:blip r:embed="rId2" cstate="print"/>
+          <a:stretch>
+            <a:fillRect/>
+          </a:stretch>
+        </p:blipFill>
+        <p:spPr>
+          <a:xfrm>
+            <a:off x="1467492" y="1729999"/>
+            <a:ext cx="6539966" cy="4531316"/>
+          </a:xfrm>
+          <a:prstGeom prst="rect">
+            <a:avLst/>
+          </a:prstGeom>
+        </p:spPr>
+      </p:pic>
     </p:spTree>
     <p:extLst>
       <p:ext uri="{BB962C8B-B14F-4D97-AF65-F5344CB8AC3E}">
@@ -14118,6 +14116,168 @@
             <p:ph type="title"/>
           </p:nvPr>
         </p:nvSpPr>
+        <p:spPr>
+          <a:xfrm>
+            <a:off x="1043490" y="402565"/>
+            <a:ext cx="7024744" cy="1143000"/>
+          </a:xfrm>
+        </p:spPr>
+        <p:txBody>
+          <a:bodyPr/>
+          <a:lstStyle/>
+          <a:p>
+            <a:r>
+              <a:rPr lang="en-US" dirty="0" smtClean="0"/>
+              <a:t>GUI Mock-Ups</a:t>
+            </a:r>
+            <a:endParaRPr lang="en-US" dirty="0"/>
+          </a:p>
+        </p:txBody>
+      </p:sp>
+      <p:pic>
+        <p:nvPicPr>
+          <p:cNvPr id="4" name="Picture" descr="A description..."/>
+          <p:cNvPicPr>
+            <a:picLocks noGrp="1"/>
+          </p:cNvPicPr>
+          <p:nvPr>
+            <p:ph idx="1"/>
+          </p:nvPr>
+        </p:nvPicPr>
+        <p:blipFill>
+          <a:blip r:embed="rId2" cstate="print"/>
+          <a:srcRect/>
+          <a:stretch>
+            <a:fillRect/>
+          </a:stretch>
+        </p:blipFill>
+        <p:spPr bwMode="auto">
+          <a:xfrm>
+            <a:off x="1086525" y="1772915"/>
+            <a:ext cx="3246128" cy="1574720"/>
+          </a:xfrm>
+          <a:prstGeom prst="rect">
+            <a:avLst/>
+          </a:prstGeom>
+          <a:noFill/>
+          <a:ln w="9525">
+            <a:noFill/>
+            <a:miter lim="800000"/>
+            <a:headEnd/>
+            <a:tailEnd/>
+          </a:ln>
+        </p:spPr>
+      </p:pic>
+      <p:pic>
+        <p:nvPicPr>
+          <p:cNvPr id="5" name="Picture" descr="A description..."/>
+          <p:cNvPicPr/>
+          <p:nvPr/>
+        </p:nvPicPr>
+        <p:blipFill>
+          <a:blip r:embed="rId3" cstate="print"/>
+          <a:srcRect/>
+          <a:stretch>
+            <a:fillRect/>
+          </a:stretch>
+        </p:blipFill>
+        <p:spPr bwMode="auto">
+          <a:xfrm>
+            <a:off x="1043490" y="3748055"/>
+            <a:ext cx="3289163" cy="2161965"/>
+          </a:xfrm>
+          <a:prstGeom prst="rect">
+            <a:avLst/>
+          </a:prstGeom>
+          <a:noFill/>
+          <a:ln w="9525">
+            <a:noFill/>
+            <a:miter lim="800000"/>
+            <a:headEnd/>
+            <a:tailEnd/>
+          </a:ln>
+        </p:spPr>
+      </p:pic>
+      <p:pic>
+        <p:nvPicPr>
+          <p:cNvPr id="6" name="Picture 5"/>
+          <p:cNvPicPr/>
+          <p:nvPr/>
+        </p:nvPicPr>
+        <p:blipFill>
+          <a:blip r:embed="rId4">
+            <a:extLst>
+              <a:ext uri="{28A0092B-C50C-407E-A947-70E740481C1C}">
+                <a14:useLocalDpi xmlns:a14="http://schemas.microsoft.com/office/drawing/2010/main" val="0"/>
+              </a:ext>
+            </a:extLst>
+          </a:blip>
+          <a:srcRect/>
+          <a:stretch>
+            <a:fillRect/>
+          </a:stretch>
+        </p:blipFill>
+        <p:spPr bwMode="auto">
+          <a:xfrm>
+            <a:off x="4698789" y="2711473"/>
+            <a:ext cx="3569335" cy="2241550"/>
+          </a:xfrm>
+          <a:prstGeom prst="rect">
+            <a:avLst/>
+          </a:prstGeom>
+          <a:noFill/>
+          <a:ln>
+            <a:noFill/>
+          </a:ln>
+        </p:spPr>
+      </p:pic>
+    </p:spTree>
+    <p:extLst>
+      <p:ext uri="{BB962C8B-B14F-4D97-AF65-F5344CB8AC3E}">
+        <p14:creationId xmlns:p14="http://schemas.microsoft.com/office/powerpoint/2010/main" val="1459248129"/>
+      </p:ext>
+    </p:extLst>
+  </p:cSld>
+  <p:clrMapOvr>
+    <a:masterClrMapping/>
+  </p:clrMapOvr>
+  <p:timing>
+    <p:tnLst>
+      <p:par>
+        <p:cTn id="1" dur="indefinite" restart="never" nodeType="tmRoot"/>
+      </p:par>
+    </p:tnLst>
+  </p:timing>
+</p:sld>
+</file>
+
+<file path=ppt/slides/slide5.xml><?xml version="1.0" encoding="utf-8"?>
+<p:sld xmlns:a="http://schemas.openxmlformats.org/drawingml/2006/main" xmlns:r="http://schemas.openxmlformats.org/officeDocument/2006/relationships" xmlns:p="http://schemas.openxmlformats.org/presentationml/2006/main">
+  <p:cSld>
+    <p:spTree>
+      <p:nvGrpSpPr>
+        <p:cNvPr id="1" name=""/>
+        <p:cNvGrpSpPr/>
+        <p:nvPr/>
+      </p:nvGrpSpPr>
+      <p:grpSpPr>
+        <a:xfrm>
+          <a:off x="0" y="0"/>
+          <a:ext cx="0" cy="0"/>
+          <a:chOff x="0" y="0"/>
+          <a:chExt cx="0" cy="0"/>
+        </a:xfrm>
+      </p:grpSpPr>
+      <p:sp>
+        <p:nvSpPr>
+          <p:cNvPr id="2" name="Title 1"/>
+          <p:cNvSpPr>
+            <a:spLocks noGrp="1"/>
+          </p:cNvSpPr>
+          <p:nvPr>
+            <p:ph type="title"/>
+          </p:nvPr>
+        </p:nvSpPr>
         <p:spPr/>
         <p:txBody>
           <a:bodyPr/>
@@ -14125,7 +14285,7 @@
           <a:p>
             <a:r>
               <a:rPr lang="en-US" dirty="0" smtClean="0"/>
-              <a:t>Schedule</a:t>
+              <a:t>Scheduling Impact</a:t>
             </a:r>
             <a:endParaRPr lang="en-US" dirty="0"/>
           </a:p>
@@ -14145,6 +14305,39 @@
         <p:txBody>
           <a:bodyPr/>
           <a:lstStyle/>
+          <a:p>
+            <a:r>
+              <a:rPr lang="en-US" dirty="0" smtClean="0"/>
+              <a:t>Focus on main features.</a:t>
+            </a:r>
+          </a:p>
+          <a:p>
+            <a:endParaRPr lang="en-US" dirty="0" smtClean="0"/>
+          </a:p>
+          <a:p>
+            <a:r>
+              <a:rPr lang="en-US" dirty="0" smtClean="0"/>
+              <a:t>Team communication to achieve consensus on issues is critical.</a:t>
+            </a:r>
+          </a:p>
+          <a:p>
+            <a:endParaRPr lang="en-US" dirty="0" smtClean="0"/>
+          </a:p>
+          <a:p>
+            <a:r>
+              <a:rPr lang="en-US" dirty="0" smtClean="0"/>
+              <a:t>Avoid Scope Creep.</a:t>
+            </a:r>
+          </a:p>
+          <a:p>
+            <a:endParaRPr lang="en-US" dirty="0" smtClean="0"/>
+          </a:p>
+          <a:p>
+            <a:r>
+              <a:rPr lang="en-US" dirty="0" smtClean="0"/>
+              <a:t>Avoid Code &amp; Fix</a:t>
+            </a:r>
+          </a:p>
           <a:p>
             <a:endParaRPr lang="en-US" dirty="0" smtClean="0"/>
           </a:p>

</xml_diff>

<commit_message>
Updated Phase2_Presentation.pptx and SRS.docx
</commit_message>
<xml_diff>
--- a/deliverables/phase2/Phase2_Presentation.pptx
+++ b/deliverables/phase2/Phase2_Presentation.pptx
@@ -2869,7 +2869,7 @@
             <a:fld id="{0A98AF03-7270-45C2-A683-C5E353EF01A5}" type="datetime4">
               <a:rPr lang="en-US" smtClean="0"/>
               <a:pPr/>
-              <a:t>February 26, 2012</a:t>
+              <a:t>February 27, 2012</a:t>
             </a:fld>
             <a:endParaRPr lang="en-US" dirty="0"/>
           </a:p>
@@ -3156,7 +3156,7 @@
             <a:fld id="{A2FB5AFD-D735-4504-A039-ADEBB6448D55}" type="datetime4">
               <a:rPr lang="en-US" smtClean="0"/>
               <a:pPr/>
-              <a:t>February 26, 2012</a:t>
+              <a:t>February 27, 2012</a:t>
             </a:fld>
             <a:endParaRPr lang="en-US" dirty="0"/>
           </a:p>
@@ -3333,7 +3333,7 @@
             <a:fld id="{AB5C8118-FB93-4E87-B380-0175F2FE2167}" type="datetime4">
               <a:rPr lang="en-US" smtClean="0"/>
               <a:pPr/>
-              <a:t>February 26, 2012</a:t>
+              <a:t>February 27, 2012</a:t>
             </a:fld>
             <a:endParaRPr lang="en-US" dirty="0"/>
           </a:p>
@@ -3500,7 +3500,7 @@
             <a:fld id="{05A93482-8E69-40F7-BCAD-5662A6CADB27}" type="datetime4">
               <a:rPr lang="en-US" smtClean="0"/>
               <a:pPr/>
-              <a:t>February 26, 2012</a:t>
+              <a:t>February 27, 2012</a:t>
             </a:fld>
             <a:endParaRPr lang="en-US" dirty="0"/>
           </a:p>
@@ -3743,7 +3743,7 @@
             <a:fld id="{FBB7EAE1-CAAC-4AEF-919E-158692B1E55E}" type="datetime4">
               <a:rPr lang="en-US" smtClean="0"/>
               <a:pPr/>
-              <a:t>February 26, 2012</a:t>
+              <a:t>February 27, 2012</a:t>
             </a:fld>
             <a:endParaRPr lang="en-US" dirty="0"/>
           </a:p>
@@ -3858,7 +3858,7 @@
             <a:fld id="{9525A706-D8F2-4D1A-855A-CADC92600C26}" type="datetime4">
               <a:rPr lang="en-US" smtClean="0"/>
               <a:pPr/>
-              <a:t>February 26, 2012</a:t>
+              <a:t>February 27, 2012</a:t>
             </a:fld>
             <a:endParaRPr lang="en-US" dirty="0"/>
           </a:p>
@@ -4399,7 +4399,7 @@
             <a:fld id="{99B4F123-1704-49AC-9D15-C4B1462B8014}" type="datetime4">
               <a:rPr lang="en-US" smtClean="0"/>
               <a:pPr/>
-              <a:t>February 26, 2012</a:t>
+              <a:t>February 27, 2012</a:t>
             </a:fld>
             <a:endParaRPr lang="en-US" dirty="0"/>
           </a:p>
@@ -4514,7 +4514,7 @@
             <a:fld id="{E3127EC2-47FB-48A1-8644-C8A81DDAA119}" type="datetime4">
               <a:rPr lang="en-US" smtClean="0"/>
               <a:pPr/>
-              <a:t>February 26, 2012</a:t>
+              <a:t>February 27, 2012</a:t>
             </a:fld>
             <a:endParaRPr lang="en-US" dirty="0"/>
           </a:p>
@@ -4606,7 +4606,7 @@
             <a:fld id="{AE3EC3ED-7435-49F9-84C8-03CCA2F8DEDB}" type="datetime4">
               <a:rPr lang="en-US" smtClean="0"/>
               <a:pPr/>
-              <a:t>February 26, 2012</a:t>
+              <a:t>February 27, 2012</a:t>
             </a:fld>
             <a:endParaRPr lang="en-US" dirty="0"/>
           </a:p>
@@ -7259,7 +7259,7 @@
             <a:fld id="{3FC49BF1-FCD3-4395-8FF6-0047AF66228E}" type="datetime4">
               <a:rPr lang="en-US" smtClean="0"/>
               <a:pPr/>
-              <a:t>February 26, 2012</a:t>
+              <a:t>February 27, 2012</a:t>
             </a:fld>
             <a:endParaRPr lang="en-US" dirty="0"/>
           </a:p>
@@ -10473,7 +10473,7 @@
             <a:fld id="{CA861222-2C8B-4501-BE87-6797EC025925}" type="datetime4">
               <a:rPr lang="en-US" smtClean="0"/>
               <a:pPr/>
-              <a:t>February 26, 2012</a:t>
+              <a:t>February 27, 2012</a:t>
             </a:fld>
             <a:endParaRPr lang="en-US" dirty="0"/>
           </a:p>
@@ -13297,7 +13297,7 @@
             <a:fld id="{16C01193-8287-4834-A286-6B880643E934}" type="datetime4">
               <a:rPr lang="en-US" smtClean="0"/>
               <a:pPr/>
-              <a:t>February 26, 2012</a:t>
+              <a:t>February 27, 2012</a:t>
             </a:fld>
             <a:endParaRPr lang="en-US" dirty="0"/>
           </a:p>
@@ -13882,7 +13882,7 @@
     </p:spTree>
     <p:extLst>
       <p:ext uri="{BB962C8B-B14F-4D97-AF65-F5344CB8AC3E}">
-        <p14:creationId xmlns:p14="http://schemas.microsoft.com/office/powerpoint/2010/main" val="1809248185"/>
+        <p14:creationId xmlns:p14="http://schemas.microsoft.com/office/powerpoint/2010/main" xmlns="" val="1809248185"/>
       </p:ext>
     </p:extLst>
   </p:cSld>
@@ -13955,8 +13955,8 @@
           <a:lstStyle/>
           <a:p>
             <a:r>
-              <a:rPr lang="en-US" dirty="0" err="1" smtClean="0"/>
-              <a:t>Functoinal</a:t>
+              <a:rPr lang="en-US" dirty="0" smtClean="0"/>
+              <a:t>Functional</a:t>
             </a:r>
             <a:endParaRPr lang="en-US" dirty="0" smtClean="0"/>
           </a:p>
@@ -13981,7 +13981,7 @@
     </p:spTree>
     <p:extLst>
       <p:ext uri="{BB962C8B-B14F-4D97-AF65-F5344CB8AC3E}">
-        <p14:creationId xmlns:p14="http://schemas.microsoft.com/office/powerpoint/2010/main" val="1092677546"/>
+        <p14:creationId xmlns:p14="http://schemas.microsoft.com/office/powerpoint/2010/main" xmlns="" val="1092677546"/>
       </p:ext>
     </p:extLst>
   </p:cSld>
@@ -14072,7 +14072,7 @@
     </p:spTree>
     <p:extLst>
       <p:ext uri="{BB962C8B-B14F-4D97-AF65-F5344CB8AC3E}">
-        <p14:creationId xmlns:p14="http://schemas.microsoft.com/office/powerpoint/2010/main" val="3037995522"/>
+        <p14:creationId xmlns:p14="http://schemas.microsoft.com/office/powerpoint/2010/main" xmlns="" val="3037995522"/>
       </p:ext>
     </p:extLst>
   </p:cSld>
@@ -14205,10 +14205,10 @@
           <p:nvPr/>
         </p:nvPicPr>
         <p:blipFill>
-          <a:blip r:embed="rId4">
+          <a:blip r:embed="rId4" cstate="print">
             <a:extLst>
               <a:ext uri="{28A0092B-C50C-407E-A947-70E740481C1C}">
-                <a14:useLocalDpi xmlns:a14="http://schemas.microsoft.com/office/drawing/2010/main" val="0"/>
+                <a14:useLocalDpi xmlns:a14="http://schemas.microsoft.com/office/drawing/2010/main" xmlns="" val="0"/>
               </a:ext>
             </a:extLst>
           </a:blip>
@@ -14234,7 +14234,7 @@
     </p:spTree>
     <p:extLst>
       <p:ext uri="{BB962C8B-B14F-4D97-AF65-F5344CB8AC3E}">
-        <p14:creationId xmlns:p14="http://schemas.microsoft.com/office/powerpoint/2010/main" val="1459248129"/>
+        <p14:creationId xmlns:p14="http://schemas.microsoft.com/office/powerpoint/2010/main" xmlns="" val="1459248129"/>
       </p:ext>
     </p:extLst>
   </p:cSld>
@@ -14346,7 +14346,7 @@
     </p:spTree>
     <p:extLst>
       <p:ext uri="{BB962C8B-B14F-4D97-AF65-F5344CB8AC3E}">
-        <p14:creationId xmlns:p14="http://schemas.microsoft.com/office/powerpoint/2010/main" val="3832736806"/>
+        <p14:creationId xmlns:p14="http://schemas.microsoft.com/office/powerpoint/2010/main" xmlns="" val="3832736806"/>
       </p:ext>
     </p:extLst>
   </p:cSld>

</xml_diff>